<commit_message>
Made some changes to the presentation and added the 02-Atmel Studio demo project.
</commit_message>
<xml_diff>
--- a/Presentation.pptx
+++ b/Presentation.pptx
@@ -6,14 +6,17 @@
   </p:sldMasterIdLst>
   <p:sldIdLst>
     <p:sldId id="256" r:id="rId2"/>
-    <p:sldId id="257" r:id="rId3"/>
-    <p:sldId id="263" r:id="rId4"/>
-    <p:sldId id="258" r:id="rId5"/>
-    <p:sldId id="260" r:id="rId6"/>
-    <p:sldId id="261" r:id="rId7"/>
-    <p:sldId id="259" r:id="rId8"/>
-    <p:sldId id="262" r:id="rId9"/>
-    <p:sldId id="264" r:id="rId10"/>
+    <p:sldId id="268" r:id="rId3"/>
+    <p:sldId id="257" r:id="rId4"/>
+    <p:sldId id="269" r:id="rId5"/>
+    <p:sldId id="258" r:id="rId6"/>
+    <p:sldId id="260" r:id="rId7"/>
+    <p:sldId id="261" r:id="rId8"/>
+    <p:sldId id="259" r:id="rId9"/>
+    <p:sldId id="266" r:id="rId10"/>
+    <p:sldId id="267" r:id="rId11"/>
+    <p:sldId id="262" r:id="rId12"/>
+    <p:sldId id="264" r:id="rId13"/>
   </p:sldIdLst>
   <p:sldSz cx="12192000" cy="6858000"/>
   <p:notesSz cx="6858000" cy="9144000"/>
@@ -112,6 +115,11 @@
       </a:defRPr>
     </a:lvl9pPr>
   </p:defaultTextStyle>
+  <p:extLst>
+    <p:ext uri="{EFAFB233-063F-42B5-8137-9DF3F51BA10A}">
+      <p15:sldGuideLst xmlns:p15="http://schemas.microsoft.com/office/powerpoint/2012/main"/>
+    </p:ext>
+  </p:extLst>
 </p:presentation>
 </file>
 
@@ -262,7 +270,7 @@
           <a:p>
             <a:fld id="{8D66F9E9-DB63-4661-BE86-31688A4AC6AD}" type="datetimeFigureOut">
               <a:rPr lang="en-US" smtClean="0"/>
-              <a:t>9/19/2018</a:t>
+              <a:t>10/17/2018</a:t>
             </a:fld>
             <a:endParaRPr lang="en-US"/>
           </a:p>
@@ -460,7 +468,7 @@
           <a:p>
             <a:fld id="{8D66F9E9-DB63-4661-BE86-31688A4AC6AD}" type="datetimeFigureOut">
               <a:rPr lang="en-US" smtClean="0"/>
-              <a:t>9/19/2018</a:t>
+              <a:t>10/17/2018</a:t>
             </a:fld>
             <a:endParaRPr lang="en-US"/>
           </a:p>
@@ -668,7 +676,7 @@
           <a:p>
             <a:fld id="{8D66F9E9-DB63-4661-BE86-31688A4AC6AD}" type="datetimeFigureOut">
               <a:rPr lang="en-US" smtClean="0"/>
-              <a:t>9/19/2018</a:t>
+              <a:t>10/17/2018</a:t>
             </a:fld>
             <a:endParaRPr lang="en-US"/>
           </a:p>
@@ -866,7 +874,7 @@
           <a:p>
             <a:fld id="{8D66F9E9-DB63-4661-BE86-31688A4AC6AD}" type="datetimeFigureOut">
               <a:rPr lang="en-US" smtClean="0"/>
-              <a:t>9/19/2018</a:t>
+              <a:t>10/17/2018</a:t>
             </a:fld>
             <a:endParaRPr lang="en-US"/>
           </a:p>
@@ -1141,7 +1149,7 @@
           <a:p>
             <a:fld id="{8D66F9E9-DB63-4661-BE86-31688A4AC6AD}" type="datetimeFigureOut">
               <a:rPr lang="en-US" smtClean="0"/>
-              <a:t>9/19/2018</a:t>
+              <a:t>10/17/2018</a:t>
             </a:fld>
             <a:endParaRPr lang="en-US"/>
           </a:p>
@@ -1406,7 +1414,7 @@
           <a:p>
             <a:fld id="{8D66F9E9-DB63-4661-BE86-31688A4AC6AD}" type="datetimeFigureOut">
               <a:rPr lang="en-US" smtClean="0"/>
-              <a:t>9/19/2018</a:t>
+              <a:t>10/17/2018</a:t>
             </a:fld>
             <a:endParaRPr lang="en-US"/>
           </a:p>
@@ -1818,7 +1826,7 @@
           <a:p>
             <a:fld id="{8D66F9E9-DB63-4661-BE86-31688A4AC6AD}" type="datetimeFigureOut">
               <a:rPr lang="en-US" smtClean="0"/>
-              <a:t>9/19/2018</a:t>
+              <a:t>10/17/2018</a:t>
             </a:fld>
             <a:endParaRPr lang="en-US"/>
           </a:p>
@@ -1959,7 +1967,7 @@
           <a:p>
             <a:fld id="{8D66F9E9-DB63-4661-BE86-31688A4AC6AD}" type="datetimeFigureOut">
               <a:rPr lang="en-US" smtClean="0"/>
-              <a:t>9/19/2018</a:t>
+              <a:t>10/17/2018</a:t>
             </a:fld>
             <a:endParaRPr lang="en-US"/>
           </a:p>
@@ -2072,7 +2080,7 @@
           <a:p>
             <a:fld id="{8D66F9E9-DB63-4661-BE86-31688A4AC6AD}" type="datetimeFigureOut">
               <a:rPr lang="en-US" smtClean="0"/>
-              <a:t>9/19/2018</a:t>
+              <a:t>10/17/2018</a:t>
             </a:fld>
             <a:endParaRPr lang="en-US"/>
           </a:p>
@@ -2383,7 +2391,7 @@
           <a:p>
             <a:fld id="{8D66F9E9-DB63-4661-BE86-31688A4AC6AD}" type="datetimeFigureOut">
               <a:rPr lang="en-US" smtClean="0"/>
-              <a:t>9/19/2018</a:t>
+              <a:t>10/17/2018</a:t>
             </a:fld>
             <a:endParaRPr lang="en-US"/>
           </a:p>
@@ -2671,7 +2679,7 @@
           <a:p>
             <a:fld id="{8D66F9E9-DB63-4661-BE86-31688A4AC6AD}" type="datetimeFigureOut">
               <a:rPr lang="en-US" smtClean="0"/>
-              <a:t>9/19/2018</a:t>
+              <a:t>10/17/2018</a:t>
             </a:fld>
             <a:endParaRPr lang="en-US"/>
           </a:p>
@@ -2912,7 +2920,7 @@
           <a:p>
             <a:fld id="{8D66F9E9-DB63-4661-BE86-31688A4AC6AD}" type="datetimeFigureOut">
               <a:rPr lang="en-US" smtClean="0"/>
-              <a:t>9/19/2018</a:t>
+              <a:t>10/17/2018</a:t>
             </a:fld>
             <a:endParaRPr lang="en-US"/>
           </a:p>
@@ -3395,6 +3403,384 @@
 </p:sld>
 </file>
 
+<file path=ppt/slides/slide10.xml><?xml version="1.0" encoding="utf-8"?>
+<p:sld xmlns:a="http://schemas.openxmlformats.org/drawingml/2006/main" xmlns:r="http://schemas.openxmlformats.org/officeDocument/2006/relationships" xmlns:p="http://schemas.openxmlformats.org/presentationml/2006/main">
+  <p:cSld>
+    <p:spTree>
+      <p:nvGrpSpPr>
+        <p:cNvPr id="1" name=""/>
+        <p:cNvGrpSpPr/>
+        <p:nvPr/>
+      </p:nvGrpSpPr>
+      <p:grpSpPr>
+        <a:xfrm>
+          <a:off x="0" y="0"/>
+          <a:ext cx="0" cy="0"/>
+          <a:chOff x="0" y="0"/>
+          <a:chExt cx="0" cy="0"/>
+        </a:xfrm>
+      </p:grpSpPr>
+      <p:sp>
+        <p:nvSpPr>
+          <p:cNvPr id="2" name="Title 1">
+            <a:extLst>
+              <a:ext uri="{FF2B5EF4-FFF2-40B4-BE49-F238E27FC236}">
+                <a16:creationId xmlns:a16="http://schemas.microsoft.com/office/drawing/2014/main" id="{8541C295-B4D6-4F26-8D0C-52D7115FDDA7}"/>
+              </a:ext>
+            </a:extLst>
+          </p:cNvPr>
+          <p:cNvSpPr>
+            <a:spLocks noGrp="1"/>
+          </p:cNvSpPr>
+          <p:nvPr>
+            <p:ph type="title"/>
+          </p:nvPr>
+        </p:nvSpPr>
+        <p:spPr/>
+        <p:txBody>
+          <a:bodyPr/>
+          <a:lstStyle/>
+          <a:p>
+            <a:r>
+              <a:rPr lang="en-US" dirty="0"/>
+              <a:t>Embedded C/C++ Gotchas</a:t>
+            </a:r>
+          </a:p>
+        </p:txBody>
+      </p:sp>
+      <p:sp>
+        <p:nvSpPr>
+          <p:cNvPr id="3" name="Content Placeholder 2">
+            <a:extLst>
+              <a:ext uri="{FF2B5EF4-FFF2-40B4-BE49-F238E27FC236}">
+                <a16:creationId xmlns:a16="http://schemas.microsoft.com/office/drawing/2014/main" id="{80804C59-CFF2-409E-BF9A-BE3D58A220AA}"/>
+              </a:ext>
+            </a:extLst>
+          </p:cNvPr>
+          <p:cNvSpPr>
+            <a:spLocks noGrp="1"/>
+          </p:cNvSpPr>
+          <p:nvPr>
+            <p:ph idx="1"/>
+          </p:nvPr>
+        </p:nvSpPr>
+        <p:spPr/>
+        <p:txBody>
+          <a:bodyPr/>
+          <a:lstStyle/>
+          <a:p>
+            <a:r>
+              <a:rPr lang="en-US" dirty="0"/>
+              <a:t>No </a:t>
+            </a:r>
+            <a:r>
+              <a:rPr lang="en-US" dirty="0" err="1"/>
+              <a:t>stdlib</a:t>
+            </a:r>
+            <a:endParaRPr lang="en-US" dirty="0"/>
+          </a:p>
+          <a:p>
+            <a:pPr lvl="1"/>
+            <a:r>
+              <a:rPr lang="en-US" dirty="0"/>
+              <a:t>Missing a lot of features you’re used to</a:t>
+            </a:r>
+          </a:p>
+          <a:p>
+            <a:pPr lvl="2"/>
+            <a:r>
+              <a:rPr lang="en-US" dirty="0"/>
+              <a:t>‘new’ keyword</a:t>
+            </a:r>
+          </a:p>
+          <a:p>
+            <a:pPr lvl="1"/>
+            <a:r>
+              <a:rPr lang="en-US" dirty="0"/>
+              <a:t>Can make your own or find them online</a:t>
+            </a:r>
+          </a:p>
+          <a:p>
+            <a:r>
+              <a:rPr lang="en-US" dirty="0"/>
+              <a:t>Trickery involved in getting unit tests created/run</a:t>
+            </a:r>
+          </a:p>
+          <a:p>
+            <a:r>
+              <a:rPr lang="en-US" dirty="0"/>
+              <a:t>Can’t debug unit tests easily </a:t>
+            </a:r>
+          </a:p>
+          <a:p>
+            <a:pPr lvl="1"/>
+            <a:r>
+              <a:rPr lang="en-US" dirty="0"/>
+              <a:t>Even though they’re compiled for x86</a:t>
+            </a:r>
+          </a:p>
+          <a:p>
+            <a:endParaRPr lang="en-US" dirty="0"/>
+          </a:p>
+        </p:txBody>
+      </p:sp>
+    </p:spTree>
+    <p:extLst>
+      <p:ext uri="{BB962C8B-B14F-4D97-AF65-F5344CB8AC3E}">
+        <p14:creationId xmlns:p14="http://schemas.microsoft.com/office/powerpoint/2010/main" val="1193952998"/>
+      </p:ext>
+    </p:extLst>
+  </p:cSld>
+  <p:clrMapOvr>
+    <a:masterClrMapping/>
+  </p:clrMapOvr>
+</p:sld>
+</file>
+
+<file path=ppt/slides/slide11.xml><?xml version="1.0" encoding="utf-8"?>
+<p:sld xmlns:a="http://schemas.openxmlformats.org/drawingml/2006/main" xmlns:r="http://schemas.openxmlformats.org/officeDocument/2006/relationships" xmlns:p="http://schemas.openxmlformats.org/presentationml/2006/main">
+  <p:cSld>
+    <p:spTree>
+      <p:nvGrpSpPr>
+        <p:cNvPr id="1" name=""/>
+        <p:cNvGrpSpPr/>
+        <p:nvPr/>
+      </p:nvGrpSpPr>
+      <p:grpSpPr>
+        <a:xfrm>
+          <a:off x="0" y="0"/>
+          <a:ext cx="0" cy="0"/>
+          <a:chOff x="0" y="0"/>
+          <a:chExt cx="0" cy="0"/>
+        </a:xfrm>
+      </p:grpSpPr>
+      <p:sp>
+        <p:nvSpPr>
+          <p:cNvPr id="2" name="Title 1">
+            <a:extLst>
+              <a:ext uri="{FF2B5EF4-FFF2-40B4-BE49-F238E27FC236}">
+                <a16:creationId xmlns:a16="http://schemas.microsoft.com/office/drawing/2014/main" id="{BF1D3485-E559-4C5C-9AE8-FDAF90EE107C}"/>
+              </a:ext>
+            </a:extLst>
+          </p:cNvPr>
+          <p:cNvSpPr>
+            <a:spLocks noGrp="1"/>
+          </p:cNvSpPr>
+          <p:nvPr>
+            <p:ph type="title"/>
+          </p:nvPr>
+        </p:nvSpPr>
+        <p:spPr/>
+        <p:txBody>
+          <a:bodyPr/>
+          <a:lstStyle/>
+          <a:p>
+            <a:r>
+              <a:rPr lang="en-US" dirty="0"/>
+              <a:t>What else to look into?</a:t>
+            </a:r>
+          </a:p>
+        </p:txBody>
+      </p:sp>
+      <p:sp>
+        <p:nvSpPr>
+          <p:cNvPr id="3" name="Content Placeholder 2">
+            <a:extLst>
+              <a:ext uri="{FF2B5EF4-FFF2-40B4-BE49-F238E27FC236}">
+                <a16:creationId xmlns:a16="http://schemas.microsoft.com/office/drawing/2014/main" id="{DB32B1E2-3425-4A03-8687-76AC80C0982D}"/>
+              </a:ext>
+            </a:extLst>
+          </p:cNvPr>
+          <p:cNvSpPr>
+            <a:spLocks noGrp="1"/>
+          </p:cNvSpPr>
+          <p:nvPr>
+            <p:ph idx="1"/>
+          </p:nvPr>
+        </p:nvSpPr>
+        <p:spPr/>
+        <p:txBody>
+          <a:bodyPr/>
+          <a:lstStyle/>
+          <a:p>
+            <a:r>
+              <a:rPr lang="en-US" dirty="0"/>
+              <a:t>Debuggers</a:t>
+            </a:r>
+          </a:p>
+          <a:p>
+            <a:pPr lvl="1"/>
+            <a:r>
+              <a:rPr lang="en-US" dirty="0"/>
+              <a:t>They exist!</a:t>
+            </a:r>
+          </a:p>
+          <a:p>
+            <a:pPr lvl="1"/>
+            <a:r>
+              <a:rPr lang="en-US" dirty="0"/>
+              <a:t>No idea how they work…</a:t>
+            </a:r>
+          </a:p>
+          <a:p>
+            <a:r>
+              <a:rPr lang="en-US" dirty="0"/>
+              <a:t>Other build systems for C/C++</a:t>
+            </a:r>
+          </a:p>
+          <a:p>
+            <a:pPr lvl="1"/>
+            <a:r>
+              <a:rPr lang="en-US" dirty="0">
+                <a:hlinkClick r:id="rId2"/>
+              </a:rPr>
+              <a:t>https://medium.com/@julienjorge/an-overview-of-build-systems-mostly-for-c-projects-ac9931494444</a:t>
+            </a:r>
+            <a:r>
+              <a:rPr lang="en-US" dirty="0"/>
+              <a:t> </a:t>
+            </a:r>
+          </a:p>
+          <a:p>
+            <a:r>
+              <a:rPr lang="en-US" dirty="0"/>
+              <a:t>Rust Language?</a:t>
+            </a:r>
+          </a:p>
+          <a:p>
+            <a:pPr lvl="1"/>
+            <a:r>
+              <a:rPr lang="en-US" dirty="0"/>
+              <a:t>Found a compiler somewhere on the internet to generate AVR. Not </a:t>
+            </a:r>
+            <a:r>
+              <a:rPr lang="en-US"/>
+              <a:t>officially supported.</a:t>
+            </a:r>
+            <a:endParaRPr lang="en-US" dirty="0"/>
+          </a:p>
+        </p:txBody>
+      </p:sp>
+    </p:spTree>
+    <p:extLst>
+      <p:ext uri="{BB962C8B-B14F-4D97-AF65-F5344CB8AC3E}">
+        <p14:creationId xmlns:p14="http://schemas.microsoft.com/office/powerpoint/2010/main" val="2395508510"/>
+      </p:ext>
+    </p:extLst>
+  </p:cSld>
+  <p:clrMapOvr>
+    <a:masterClrMapping/>
+  </p:clrMapOvr>
+</p:sld>
+</file>
+
+<file path=ppt/slides/slide12.xml><?xml version="1.0" encoding="utf-8"?>
+<p:sld xmlns:a="http://schemas.openxmlformats.org/drawingml/2006/main" xmlns:r="http://schemas.openxmlformats.org/officeDocument/2006/relationships" xmlns:p="http://schemas.openxmlformats.org/presentationml/2006/main">
+  <p:cSld>
+    <p:spTree>
+      <p:nvGrpSpPr>
+        <p:cNvPr id="1" name=""/>
+        <p:cNvGrpSpPr/>
+        <p:nvPr/>
+      </p:nvGrpSpPr>
+      <p:grpSpPr>
+        <a:xfrm>
+          <a:off x="0" y="0"/>
+          <a:ext cx="0" cy="0"/>
+          <a:chOff x="0" y="0"/>
+          <a:chExt cx="0" cy="0"/>
+        </a:xfrm>
+      </p:grpSpPr>
+      <p:sp>
+        <p:nvSpPr>
+          <p:cNvPr id="2" name="Title 1">
+            <a:extLst>
+              <a:ext uri="{FF2B5EF4-FFF2-40B4-BE49-F238E27FC236}">
+                <a16:creationId xmlns:a16="http://schemas.microsoft.com/office/drawing/2014/main" id="{052826F9-4EE7-4A89-A4FE-76B6169F1069}"/>
+              </a:ext>
+            </a:extLst>
+          </p:cNvPr>
+          <p:cNvSpPr>
+            <a:spLocks noGrp="1"/>
+          </p:cNvSpPr>
+          <p:nvPr>
+            <p:ph type="title"/>
+          </p:nvPr>
+        </p:nvSpPr>
+        <p:spPr/>
+        <p:txBody>
+          <a:bodyPr/>
+          <a:lstStyle/>
+          <a:p>
+            <a:r>
+              <a:rPr lang="en-US" dirty="0"/>
+              <a:t>Other Resources</a:t>
+            </a:r>
+          </a:p>
+        </p:txBody>
+      </p:sp>
+      <p:sp>
+        <p:nvSpPr>
+          <p:cNvPr id="3" name="Content Placeholder 2">
+            <a:extLst>
+              <a:ext uri="{FF2B5EF4-FFF2-40B4-BE49-F238E27FC236}">
+                <a16:creationId xmlns:a16="http://schemas.microsoft.com/office/drawing/2014/main" id="{319FEAD7-6601-4185-87F0-69EFEC033A5F}"/>
+              </a:ext>
+            </a:extLst>
+          </p:cNvPr>
+          <p:cNvSpPr>
+            <a:spLocks noGrp="1"/>
+          </p:cNvSpPr>
+          <p:nvPr>
+            <p:ph idx="1"/>
+          </p:nvPr>
+        </p:nvSpPr>
+        <p:spPr/>
+        <p:txBody>
+          <a:bodyPr/>
+          <a:lstStyle/>
+          <a:p>
+            <a:r>
+              <a:rPr lang="en-US" dirty="0"/>
+              <a:t>ATMEL AVR Microcontrollers book</a:t>
+            </a:r>
+          </a:p>
+          <a:p>
+            <a:pPr lvl="1"/>
+            <a:r>
+              <a:rPr lang="en-US" dirty="0"/>
+              <a:t>Starts out with a great description embedded development in general</a:t>
+            </a:r>
+          </a:p>
+          <a:p>
+            <a:pPr lvl="1"/>
+            <a:r>
+              <a:rPr lang="en-US" dirty="0">
+                <a:hlinkClick r:id="rId2"/>
+              </a:rPr>
+              <a:t>https://www.amazon.com/Programming-Interfacing-ATMELs-Thomas-Grace/dp/1305509994</a:t>
+            </a:r>
+            <a:endParaRPr lang="en-US" dirty="0"/>
+          </a:p>
+          <a:p>
+            <a:pPr lvl="1"/>
+            <a:endParaRPr lang="en-US" dirty="0"/>
+          </a:p>
+        </p:txBody>
+      </p:sp>
+    </p:spTree>
+    <p:extLst>
+      <p:ext uri="{BB962C8B-B14F-4D97-AF65-F5344CB8AC3E}">
+        <p14:creationId xmlns:p14="http://schemas.microsoft.com/office/powerpoint/2010/main" val="908638447"/>
+      </p:ext>
+    </p:extLst>
+  </p:cSld>
+  <p:clrMapOvr>
+    <a:masterClrMapping/>
+  </p:clrMapOvr>
+</p:sld>
+</file>
+
 <file path=ppt/slides/slide2.xml><?xml version="1.0" encoding="utf-8"?>
 <p:sld xmlns:a="http://schemas.openxmlformats.org/drawingml/2006/main" xmlns:r="http://schemas.openxmlformats.org/officeDocument/2006/relationships" xmlns:p="http://schemas.openxmlformats.org/presentationml/2006/main">
   <p:cSld>
@@ -3417,7 +3803,7 @@
           <p:cNvPr id="2" name="Title 1">
             <a:extLst>
               <a:ext uri="{FF2B5EF4-FFF2-40B4-BE49-F238E27FC236}">
-                <a16:creationId xmlns:a16="http://schemas.microsoft.com/office/drawing/2014/main" id="{DF8E4E28-895E-4B96-8626-7849D2C71D9D}"/>
+                <a16:creationId xmlns:a16="http://schemas.microsoft.com/office/drawing/2014/main" id="{22BD6513-BC69-4E68-91B3-40BDEC6397E7}"/>
               </a:ext>
             </a:extLst>
           </p:cNvPr>
@@ -3435,7 +3821,7 @@
           <a:p>
             <a:r>
               <a:rPr lang="en-US" dirty="0"/>
-              <a:t>Bio</a:t>
+              <a:t>Abstract</a:t>
             </a:r>
           </a:p>
         </p:txBody>
@@ -3445,7 +3831,7 @@
           <p:cNvPr id="3" name="Content Placeholder 2">
             <a:extLst>
               <a:ext uri="{FF2B5EF4-FFF2-40B4-BE49-F238E27FC236}">
-                <a16:creationId xmlns:a16="http://schemas.microsoft.com/office/drawing/2014/main" id="{9AE64D4C-D0FB-41A7-A74E-9A9B6FD98D58}"/>
+                <a16:creationId xmlns:a16="http://schemas.microsoft.com/office/drawing/2014/main" id="{ED4D21EF-E8A9-4ED9-B8BF-67090DF2B51F}"/>
               </a:ext>
             </a:extLst>
           </p:cNvPr>
@@ -3463,39 +3849,13 @@
           <a:p>
             <a:r>
               <a:rPr lang="en-US" dirty="0"/>
-              <a:t>Al Rodriguez</a:t>
-            </a:r>
-          </a:p>
-          <a:p>
-            <a:r>
-              <a:rPr lang="en-US" dirty="0"/>
-              <a:t>.NET Dev for over a decade</a:t>
-            </a:r>
-          </a:p>
-          <a:p>
-            <a:r>
-              <a:rPr lang="en-US" dirty="0"/>
-              <a:t>Java dev for the beginning of that</a:t>
-            </a:r>
-          </a:p>
-          <a:p>
-            <a:r>
-              <a:rPr lang="en-US" dirty="0"/>
-              <a:t>C++ dev for a few weeks</a:t>
-            </a:r>
-          </a:p>
-          <a:p>
-            <a:r>
-              <a:rPr lang="en-US" dirty="0"/>
-              <a:t>@</a:t>
-            </a:r>
-            <a:r>
-              <a:rPr lang="en-US" dirty="0" err="1"/>
-              <a:t>ProgrammerAL</a:t>
-            </a:r>
-            <a:r>
-              <a:rPr lang="en-US" dirty="0"/>
-              <a:t> on Twitter</a:t>
+              <a:t>Learn how to write embedded software with tools that aren’t the Arduino IDE</a:t>
+            </a:r>
+          </a:p>
+          <a:p>
+            <a:r>
+              <a:rPr lang="en-US" dirty="0"/>
+              <a:t>Learn how to work with C/C++ for embedded development</a:t>
             </a:r>
           </a:p>
         </p:txBody>
@@ -3503,7 +3863,7 @@
     </p:spTree>
     <p:extLst>
       <p:ext uri="{BB962C8B-B14F-4D97-AF65-F5344CB8AC3E}">
-        <p14:creationId xmlns:p14="http://schemas.microsoft.com/office/powerpoint/2010/main" val="3873850937"/>
+        <p14:creationId xmlns:p14="http://schemas.microsoft.com/office/powerpoint/2010/main" val="2753329065"/>
       </p:ext>
     </p:extLst>
   </p:cSld>
@@ -3535,7 +3895,7 @@
           <p:cNvPr id="2" name="Title 1">
             <a:extLst>
               <a:ext uri="{FF2B5EF4-FFF2-40B4-BE49-F238E27FC236}">
-                <a16:creationId xmlns:a16="http://schemas.microsoft.com/office/drawing/2014/main" id="{04101F83-982D-4D96-9629-573F5E7E3026}"/>
+                <a16:creationId xmlns:a16="http://schemas.microsoft.com/office/drawing/2014/main" id="{DF8E4E28-895E-4B96-8626-7849D2C71D9D}"/>
               </a:ext>
             </a:extLst>
           </p:cNvPr>
@@ -3553,7 +3913,7 @@
           <a:p>
             <a:r>
               <a:rPr lang="en-US" dirty="0"/>
-              <a:t>Arduino IDE</a:t>
+              <a:t>Speaker Bio</a:t>
             </a:r>
           </a:p>
         </p:txBody>
@@ -3563,7 +3923,7 @@
           <p:cNvPr id="3" name="Content Placeholder 2">
             <a:extLst>
               <a:ext uri="{FF2B5EF4-FFF2-40B4-BE49-F238E27FC236}">
-                <a16:creationId xmlns:a16="http://schemas.microsoft.com/office/drawing/2014/main" id="{4837798F-04E4-4B77-94A0-B4A2D7A992B7}"/>
+                <a16:creationId xmlns:a16="http://schemas.microsoft.com/office/drawing/2014/main" id="{9AE64D4C-D0FB-41A7-A74E-9A9B6FD98D58}"/>
               </a:ext>
             </a:extLst>
           </p:cNvPr>
@@ -3579,28 +3939,49 @@
           <a:bodyPr/>
           <a:lstStyle/>
           <a:p>
-            <a:endParaRPr lang="en-US" dirty="0">
-              <a:hlinkClick r:id="rId2"/>
-            </a:endParaRPr>
-          </a:p>
-          <a:p>
-            <a:r>
-              <a:rPr lang="en-US" dirty="0">
-                <a:hlinkClick r:id="rId2"/>
-              </a:rPr>
-              <a:t>https://www.arduino.cc/</a:t>
-            </a:r>
-            <a:endParaRPr lang="en-US" dirty="0"/>
-          </a:p>
-          <a:p>
-            <a:endParaRPr lang="en-US" dirty="0"/>
+            <a:r>
+              <a:rPr lang="en-US" dirty="0"/>
+              <a:t>Al Rodriguez</a:t>
+            </a:r>
+          </a:p>
+          <a:p>
+            <a:r>
+              <a:rPr lang="en-US" dirty="0"/>
+              <a:t>.NET Dev for over a decade</a:t>
+            </a:r>
+          </a:p>
+          <a:p>
+            <a:r>
+              <a:rPr lang="en-US" dirty="0"/>
+              <a:t>Java dev for the beginning of that</a:t>
+            </a:r>
+          </a:p>
+          <a:p>
+            <a:r>
+              <a:rPr lang="en-US" dirty="0"/>
+              <a:t>C++ dev for a few weeks</a:t>
+            </a:r>
+          </a:p>
+          <a:p>
+            <a:r>
+              <a:rPr lang="en-US" dirty="0"/>
+              <a:t>@</a:t>
+            </a:r>
+            <a:r>
+              <a:rPr lang="en-US" dirty="0" err="1"/>
+              <a:t>ProgrammerAL</a:t>
+            </a:r>
+            <a:r>
+              <a:rPr lang="en-US" dirty="0"/>
+              <a:t> on Twitter</a:t>
+            </a:r>
           </a:p>
         </p:txBody>
       </p:sp>
     </p:spTree>
     <p:extLst>
       <p:ext uri="{BB962C8B-B14F-4D97-AF65-F5344CB8AC3E}">
-        <p14:creationId xmlns:p14="http://schemas.microsoft.com/office/powerpoint/2010/main" val="3981991364"/>
+        <p14:creationId xmlns:p14="http://schemas.microsoft.com/office/powerpoint/2010/main" val="3873850937"/>
       </p:ext>
     </p:extLst>
   </p:cSld>
@@ -3632,7 +4013,7 @@
           <p:cNvPr id="2" name="Title 1">
             <a:extLst>
               <a:ext uri="{FF2B5EF4-FFF2-40B4-BE49-F238E27FC236}">
-                <a16:creationId xmlns:a16="http://schemas.microsoft.com/office/drawing/2014/main" id="{C4475705-8E6B-4B05-B794-8AA935E3043C}"/>
+                <a16:creationId xmlns:a16="http://schemas.microsoft.com/office/drawing/2014/main" id="{A1E875AB-9206-4F38-B58D-DB9E120A7025}"/>
               </a:ext>
             </a:extLst>
           </p:cNvPr>
@@ -3650,7 +4031,7 @@
           <a:p>
             <a:r>
               <a:rPr lang="en-US" dirty="0"/>
-              <a:t>Arduino IDE</a:t>
+              <a:t>Steps to Create an Embedded App</a:t>
             </a:r>
           </a:p>
         </p:txBody>
@@ -3660,7 +4041,7 @@
           <p:cNvPr id="3" name="Content Placeholder 2">
             <a:extLst>
               <a:ext uri="{FF2B5EF4-FFF2-40B4-BE49-F238E27FC236}">
-                <a16:creationId xmlns:a16="http://schemas.microsoft.com/office/drawing/2014/main" id="{3796639E-84C0-47E6-AF3D-5AC335CD7F9C}"/>
+                <a16:creationId xmlns:a16="http://schemas.microsoft.com/office/drawing/2014/main" id="{33B1EE81-4162-4F3A-84DC-03B5CF510057}"/>
               </a:ext>
             </a:extLst>
           </p:cNvPr>
@@ -3678,59 +4059,26 @@
           <a:p>
             <a:r>
               <a:rPr lang="en-US" dirty="0"/>
-              <a:t>Pros</a:t>
+              <a:t>1) Type out the code</a:t>
+            </a:r>
+          </a:p>
+          <a:p>
+            <a:r>
+              <a:rPr lang="en-US" dirty="0"/>
+              <a:t>2) Compile to Native Instructions (8-bit ARM in our case)</a:t>
             </a:r>
           </a:p>
           <a:p>
             <a:pPr lvl="1"/>
             <a:r>
               <a:rPr lang="en-US" dirty="0"/>
-              <a:t>Easy to setup</a:t>
-            </a:r>
-          </a:p>
-          <a:p>
-            <a:pPr lvl="1"/>
-            <a:r>
-              <a:rPr lang="en-US" dirty="0"/>
-              <a:t>Abstracts low level concepts</a:t>
-            </a:r>
-          </a:p>
-          <a:p>
-            <a:pPr lvl="1"/>
-            <a:r>
-              <a:rPr lang="en-US" dirty="0"/>
-              <a:t>C and C++ under the hood</a:t>
-            </a:r>
-          </a:p>
-          <a:p>
-            <a:pPr lvl="1"/>
-            <a:r>
-              <a:rPr lang="en-US" dirty="0"/>
-              <a:t>Adding external libraries is very easy</a:t>
-            </a:r>
-          </a:p>
-          <a:p>
-            <a:r>
-              <a:rPr lang="en-US" dirty="0"/>
-              <a:t>Cons</a:t>
-            </a:r>
-          </a:p>
-          <a:p>
-            <a:pPr lvl="1"/>
-            <a:r>
-              <a:rPr lang="en-US" dirty="0"/>
-              <a:t>Built for prototyping</a:t>
-            </a:r>
-          </a:p>
-          <a:p>
-            <a:pPr lvl="1"/>
-            <a:r>
-              <a:rPr lang="en-US"/>
-              <a:t>Proprietary </a:t>
-            </a:r>
-            <a:r>
-              <a:rPr lang="en-US" dirty="0"/>
-              <a:t>project system</a:t>
+              <a:t>With choice of compiler depending on language</a:t>
+            </a:r>
+          </a:p>
+          <a:p>
+            <a:r>
+              <a:rPr lang="en-US" dirty="0"/>
+              <a:t>3) Copy binary file to target board</a:t>
             </a:r>
           </a:p>
         </p:txBody>
@@ -3738,7 +4086,7 @@
     </p:spTree>
     <p:extLst>
       <p:ext uri="{BB962C8B-B14F-4D97-AF65-F5344CB8AC3E}">
-        <p14:creationId xmlns:p14="http://schemas.microsoft.com/office/powerpoint/2010/main" val="2397975279"/>
+        <p14:creationId xmlns:p14="http://schemas.microsoft.com/office/powerpoint/2010/main" val="3492351098"/>
       </p:ext>
     </p:extLst>
   </p:cSld>
@@ -3751,6 +4099,14 @@
 <file path=ppt/slides/slide5.xml><?xml version="1.0" encoding="utf-8"?>
 <p:sld xmlns:a="http://schemas.openxmlformats.org/drawingml/2006/main" xmlns:r="http://schemas.openxmlformats.org/officeDocument/2006/relationships" xmlns:p="http://schemas.openxmlformats.org/presentationml/2006/main">
   <p:cSld>
+    <p:bg>
+      <p:bgPr>
+        <a:solidFill>
+          <a:schemeClr val="bg1"/>
+        </a:solidFill>
+        <a:effectLst/>
+      </p:bgPr>
+    </p:bg>
     <p:spTree>
       <p:nvGrpSpPr>
         <p:cNvPr id="1" name=""/>
@@ -3770,7 +4126,7 @@
           <p:cNvPr id="2" name="Title 1">
             <a:extLst>
               <a:ext uri="{FF2B5EF4-FFF2-40B4-BE49-F238E27FC236}">
-                <a16:creationId xmlns:a16="http://schemas.microsoft.com/office/drawing/2014/main" id="{56EABF79-275E-4755-9432-95472461A002}"/>
+                <a16:creationId xmlns:a16="http://schemas.microsoft.com/office/drawing/2014/main" id="{C4475705-8E6B-4B05-B794-8AA935E3043C}"/>
               </a:ext>
             </a:extLst>
           </p:cNvPr>
@@ -3781,15 +4137,23 @@
             <p:ph type="title"/>
           </p:nvPr>
         </p:nvSpPr>
-        <p:spPr/>
-        <p:txBody>
-          <a:bodyPr/>
-          <a:lstStyle/>
-          <a:p>
-            <a:r>
-              <a:rPr lang="en-US" dirty="0"/>
-              <a:t>Atmel Studio</a:t>
-            </a:r>
+        <p:spPr>
+          <a:xfrm>
+            <a:off x="838200" y="365125"/>
+            <a:ext cx="10515600" cy="1325563"/>
+          </a:xfrm>
+        </p:spPr>
+        <p:txBody>
+          <a:bodyPr>
+            <a:normAutofit/>
+          </a:bodyPr>
+          <a:lstStyle/>
+          <a:p>
+            <a:r>
+              <a:rPr lang="en-US"/>
+              <a:t>Arduino IDE</a:t>
+            </a:r>
+            <a:endParaRPr lang="en-US" dirty="0"/>
           </a:p>
         </p:txBody>
       </p:sp>
@@ -3798,7 +4162,7 @@
           <p:cNvPr id="3" name="Content Placeholder 2">
             <a:extLst>
               <a:ext uri="{FF2B5EF4-FFF2-40B4-BE49-F238E27FC236}">
-                <a16:creationId xmlns:a16="http://schemas.microsoft.com/office/drawing/2014/main" id="{F207CE43-F027-43D2-AEE9-B52683E45E5D}"/>
+                <a16:creationId xmlns:a16="http://schemas.microsoft.com/office/drawing/2014/main" id="{3796639E-84C0-47E6-AF3D-5AC335CD7F9C}"/>
               </a:ext>
             </a:extLst>
           </p:cNvPr>
@@ -3809,63 +4173,115 @@
             <p:ph idx="1"/>
           </p:nvPr>
         </p:nvSpPr>
-        <p:spPr/>
-        <p:txBody>
-          <a:bodyPr/>
-          <a:lstStyle/>
-          <a:p>
-            <a:r>
-              <a:rPr lang="en-US" dirty="0"/>
+        <p:spPr>
+          <a:xfrm>
+            <a:off x="838200" y="1825625"/>
+            <a:ext cx="3797807" cy="4351338"/>
+          </a:xfrm>
+        </p:spPr>
+        <p:txBody>
+          <a:bodyPr>
+            <a:normAutofit/>
+          </a:bodyPr>
+          <a:lstStyle/>
+          <a:p>
+            <a:r>
+              <a:rPr lang="en-US" sz="2000" dirty="0">
+                <a:hlinkClick r:id="rId2"/>
+              </a:rPr>
+              <a:t>https://www.arduino.cc/</a:t>
+            </a:r>
+            <a:endParaRPr lang="en-US" sz="2000" dirty="0"/>
+          </a:p>
+          <a:p>
+            <a:r>
+              <a:rPr lang="en-US" sz="2000" dirty="0"/>
               <a:t>Pros</a:t>
             </a:r>
           </a:p>
           <a:p>
             <a:pPr lvl="1"/>
             <a:r>
-              <a:rPr lang="en-US" dirty="0"/>
-              <a:t>Lots of tools built in</a:t>
+              <a:rPr lang="en-US" sz="2000" dirty="0"/>
+              <a:t>Easy to setup</a:t>
             </a:r>
           </a:p>
           <a:p>
             <a:pPr lvl="1"/>
             <a:r>
-              <a:rPr lang="en-US" dirty="0"/>
-              <a:t>Can work with C, C++, and Arduino projects</a:t>
+              <a:rPr lang="en-US" sz="2000" dirty="0"/>
+              <a:t>Abstracts low level concepts</a:t>
             </a:r>
           </a:p>
           <a:p>
             <a:pPr lvl="1"/>
             <a:r>
-              <a:rPr lang="en-US" dirty="0"/>
-              <a:t>Familiar if you use Visual Studio</a:t>
-            </a:r>
-          </a:p>
-          <a:p>
-            <a:r>
-              <a:rPr lang="en-US" dirty="0"/>
+              <a:rPr lang="en-US" sz="2000" dirty="0"/>
+              <a:t>C and C++ under the hood</a:t>
+            </a:r>
+          </a:p>
+          <a:p>
+            <a:pPr lvl="1"/>
+            <a:r>
+              <a:rPr lang="en-US" sz="2000" dirty="0"/>
+              <a:t>Adding external libraries is very easy</a:t>
+            </a:r>
+          </a:p>
+          <a:p>
+            <a:r>
+              <a:rPr lang="en-US" sz="2000" dirty="0"/>
               <a:t>Cons</a:t>
             </a:r>
           </a:p>
           <a:p>
             <a:pPr lvl="1"/>
             <a:r>
-              <a:rPr lang="en-US" dirty="0"/>
-              <a:t>Some manual setup</a:t>
+              <a:rPr lang="en-US" sz="2000" dirty="0"/>
+              <a:t>Built for prototyping</a:t>
             </a:r>
           </a:p>
           <a:p>
             <a:pPr lvl="1"/>
             <a:r>
-              <a:rPr lang="en-US" dirty="0"/>
+              <a:rPr lang="en-US" sz="2000" dirty="0"/>
               <a:t>Proprietary project system</a:t>
             </a:r>
           </a:p>
         </p:txBody>
       </p:sp>
+      <p:pic>
+        <p:nvPicPr>
+          <p:cNvPr id="4" name="Picture 3">
+            <a:extLst>
+              <a:ext uri="{FF2B5EF4-FFF2-40B4-BE49-F238E27FC236}">
+                <a16:creationId xmlns:a16="http://schemas.microsoft.com/office/drawing/2014/main" id="{FD245F2F-7783-410B-8719-91C7238014AA}"/>
+              </a:ext>
+            </a:extLst>
+          </p:cNvPr>
+          <p:cNvPicPr>
+            <a:picLocks noChangeAspect="1"/>
+          </p:cNvPicPr>
+          <p:nvPr/>
+        </p:nvPicPr>
+        <p:blipFill rotWithShape="1">
+          <a:blip r:embed="rId3"/>
+          <a:srcRect r="1" b="13231"/>
+          <a:stretch/>
+        </p:blipFill>
+        <p:spPr>
+          <a:xfrm>
+            <a:off x="5120640" y="1904281"/>
+            <a:ext cx="6233160" cy="4272681"/>
+          </a:xfrm>
+          <a:prstGeom prst="rect">
+            <a:avLst/>
+          </a:prstGeom>
+        </p:spPr>
+      </p:pic>
     </p:spTree>
     <p:extLst>
       <p:ext uri="{BB962C8B-B14F-4D97-AF65-F5344CB8AC3E}">
-        <p14:creationId xmlns:p14="http://schemas.microsoft.com/office/powerpoint/2010/main" val="3296481886"/>
+        <p14:creationId xmlns:p14="http://schemas.microsoft.com/office/powerpoint/2010/main" val="2397975279"/>
       </p:ext>
     </p:extLst>
   </p:cSld>
@@ -3878,6 +4294,14 @@
 <file path=ppt/slides/slide6.xml><?xml version="1.0" encoding="utf-8"?>
 <p:sld xmlns:a="http://schemas.openxmlformats.org/drawingml/2006/main" xmlns:r="http://schemas.openxmlformats.org/officeDocument/2006/relationships" xmlns:p="http://schemas.openxmlformats.org/presentationml/2006/main">
   <p:cSld>
+    <p:bg>
+      <p:bgPr>
+        <a:solidFill>
+          <a:schemeClr val="bg1"/>
+        </a:solidFill>
+        <a:effectLst/>
+      </p:bgPr>
+    </p:bg>
     <p:spTree>
       <p:nvGrpSpPr>
         <p:cNvPr id="1" name=""/>
@@ -3897,7 +4321,7 @@
           <p:cNvPr id="2" name="Title 1">
             <a:extLst>
               <a:ext uri="{FF2B5EF4-FFF2-40B4-BE49-F238E27FC236}">
-                <a16:creationId xmlns:a16="http://schemas.microsoft.com/office/drawing/2014/main" id="{207D9E52-D214-4BD3-A98F-F30BE3242539}"/>
+                <a16:creationId xmlns:a16="http://schemas.microsoft.com/office/drawing/2014/main" id="{56EABF79-275E-4755-9432-95472461A002}"/>
               </a:ext>
             </a:extLst>
           </p:cNvPr>
@@ -3908,20 +4332,22 @@
             <p:ph type="title"/>
           </p:nvPr>
         </p:nvSpPr>
-        <p:spPr/>
-        <p:txBody>
-          <a:bodyPr/>
-          <a:lstStyle/>
-          <a:p>
-            <a:r>
-              <a:rPr lang="en-US" dirty="0"/>
-              <a:t>Roll Your Own with </a:t>
-            </a:r>
-            <a:r>
-              <a:rPr lang="en-US" dirty="0" err="1"/>
-              <a:t>CMake</a:t>
-            </a:r>
-            <a:endParaRPr lang="en-US" dirty="0"/>
+        <p:spPr>
+          <a:xfrm>
+            <a:off x="838200" y="365125"/>
+            <a:ext cx="10515600" cy="1325563"/>
+          </a:xfrm>
+        </p:spPr>
+        <p:txBody>
+          <a:bodyPr>
+            <a:normAutofit/>
+          </a:bodyPr>
+          <a:lstStyle/>
+          <a:p>
+            <a:r>
+              <a:rPr lang="en-US" dirty="0"/>
+              <a:t>Atmel Studio</a:t>
+            </a:r>
           </a:p>
         </p:txBody>
       </p:sp>
@@ -3930,7 +4356,7 @@
           <p:cNvPr id="3" name="Content Placeholder 2">
             <a:extLst>
               <a:ext uri="{FF2B5EF4-FFF2-40B4-BE49-F238E27FC236}">
-                <a16:creationId xmlns:a16="http://schemas.microsoft.com/office/drawing/2014/main" id="{AB0B476E-88F8-4EFF-AAAD-2F145BDD45E0}"/>
+                <a16:creationId xmlns:a16="http://schemas.microsoft.com/office/drawing/2014/main" id="{F207CE43-F027-43D2-AEE9-B52683E45E5D}"/>
               </a:ext>
             </a:extLst>
           </p:cNvPr>
@@ -3941,63 +4367,99 @@
             <p:ph idx="1"/>
           </p:nvPr>
         </p:nvSpPr>
-        <p:spPr/>
-        <p:txBody>
-          <a:bodyPr/>
-          <a:lstStyle/>
-          <a:p>
-            <a:r>
-              <a:rPr lang="en-US" dirty="0"/>
+        <p:spPr>
+          <a:xfrm>
+            <a:off x="838200" y="1825625"/>
+            <a:ext cx="3797807" cy="4351338"/>
+          </a:xfrm>
+        </p:spPr>
+        <p:txBody>
+          <a:bodyPr>
+            <a:normAutofit/>
+          </a:bodyPr>
+          <a:lstStyle/>
+          <a:p>
+            <a:r>
+              <a:rPr lang="en-US" sz="2000"/>
               <a:t>Pros</a:t>
             </a:r>
           </a:p>
           <a:p>
             <a:pPr lvl="1"/>
             <a:r>
-              <a:rPr lang="en-US" dirty="0"/>
-              <a:t>Cross Platform</a:t>
+              <a:rPr lang="en-US" sz="2000"/>
+              <a:t>Lots of tools built in</a:t>
             </a:r>
           </a:p>
           <a:p>
             <a:pPr lvl="1"/>
             <a:r>
-              <a:rPr lang="en-US" dirty="0"/>
-              <a:t>Cross IDE</a:t>
+              <a:rPr lang="en-US" sz="2000"/>
+              <a:t>Can work with C, C++, and Arduino projects</a:t>
             </a:r>
           </a:p>
           <a:p>
             <a:pPr lvl="1"/>
             <a:r>
-              <a:rPr lang="en-US" dirty="0"/>
-              <a:t>Can add unit tests!!!</a:t>
-            </a:r>
-          </a:p>
-          <a:p>
-            <a:r>
-              <a:rPr lang="en-US" dirty="0"/>
+              <a:rPr lang="en-US" sz="2000"/>
+              <a:t>Familiar if you use Visual Studio</a:t>
+            </a:r>
+          </a:p>
+          <a:p>
+            <a:r>
+              <a:rPr lang="en-US" sz="2000"/>
               <a:t>Cons</a:t>
             </a:r>
           </a:p>
           <a:p>
             <a:pPr lvl="1"/>
             <a:r>
-              <a:rPr lang="en-US" dirty="0"/>
-              <a:t>Lots of time to setup</a:t>
+              <a:rPr lang="en-US" sz="2000"/>
+              <a:t>Some manual setup</a:t>
             </a:r>
           </a:p>
           <a:p>
             <a:pPr lvl="1"/>
             <a:r>
-              <a:rPr lang="en-US" dirty="0"/>
-              <a:t>Easy to lose cross-platform benefits</a:t>
-            </a:r>
-          </a:p>
-        </p:txBody>
-      </p:sp>
+              <a:rPr lang="en-US" sz="2000"/>
+              <a:t>Proprietary project system</a:t>
+            </a:r>
+          </a:p>
+        </p:txBody>
+      </p:sp>
+      <p:pic>
+        <p:nvPicPr>
+          <p:cNvPr id="4" name="Picture 3">
+            <a:extLst>
+              <a:ext uri="{FF2B5EF4-FFF2-40B4-BE49-F238E27FC236}">
+                <a16:creationId xmlns:a16="http://schemas.microsoft.com/office/drawing/2014/main" id="{64F3AC0F-CBD4-422F-87AF-0859397ADDC1}"/>
+              </a:ext>
+            </a:extLst>
+          </p:cNvPr>
+          <p:cNvPicPr>
+            <a:picLocks noChangeAspect="1"/>
+          </p:cNvPicPr>
+          <p:nvPr/>
+        </p:nvPicPr>
+        <p:blipFill rotWithShape="1">
+          <a:blip r:embed="rId2"/>
+          <a:srcRect r="14295" b="2"/>
+          <a:stretch/>
+        </p:blipFill>
+        <p:spPr>
+          <a:xfrm>
+            <a:off x="5120640" y="1904281"/>
+            <a:ext cx="6233160" cy="4272681"/>
+          </a:xfrm>
+          <a:prstGeom prst="rect">
+            <a:avLst/>
+          </a:prstGeom>
+        </p:spPr>
+      </p:pic>
     </p:spTree>
     <p:extLst>
       <p:ext uri="{BB962C8B-B14F-4D97-AF65-F5344CB8AC3E}">
-        <p14:creationId xmlns:p14="http://schemas.microsoft.com/office/powerpoint/2010/main" val="3030896848"/>
+        <p14:creationId xmlns:p14="http://schemas.microsoft.com/office/powerpoint/2010/main" val="3296481886"/>
       </p:ext>
     </p:extLst>
   </p:cSld>
@@ -4029,7 +4491,7 @@
           <p:cNvPr id="2" name="Title 1">
             <a:extLst>
               <a:ext uri="{FF2B5EF4-FFF2-40B4-BE49-F238E27FC236}">
-                <a16:creationId xmlns:a16="http://schemas.microsoft.com/office/drawing/2014/main" id="{A128EE65-31EF-44FE-BC67-CA80A8E287D1}"/>
+                <a16:creationId xmlns:a16="http://schemas.microsoft.com/office/drawing/2014/main" id="{207D9E52-D214-4BD3-A98F-F30BE3242539}"/>
               </a:ext>
             </a:extLst>
           </p:cNvPr>
@@ -4047,8 +4509,13 @@
           <a:p>
             <a:r>
               <a:rPr lang="en-US" dirty="0"/>
-              <a:t>Other Systems</a:t>
-            </a:r>
+              <a:t>Roll Your Own with </a:t>
+            </a:r>
+            <a:r>
+              <a:rPr lang="en-US" dirty="0" err="1"/>
+              <a:t>CMake</a:t>
+            </a:r>
+            <a:endParaRPr lang="en-US" dirty="0"/>
           </a:p>
         </p:txBody>
       </p:sp>
@@ -4057,7 +4524,7 @@
           <p:cNvPr id="3" name="Content Placeholder 2">
             <a:extLst>
               <a:ext uri="{FF2B5EF4-FFF2-40B4-BE49-F238E27FC236}">
-                <a16:creationId xmlns:a16="http://schemas.microsoft.com/office/drawing/2014/main" id="{97A065C6-0EE3-49F1-B89B-5E171E168131}"/>
+                <a16:creationId xmlns:a16="http://schemas.microsoft.com/office/drawing/2014/main" id="{AB0B476E-88F8-4EFF-AAAD-2F145BDD45E0}"/>
               </a:ext>
             </a:extLst>
           </p:cNvPr>
@@ -4075,25 +4542,56 @@
           <a:p>
             <a:r>
               <a:rPr lang="en-US" dirty="0"/>
-              <a:t>Arduino CLI</a:t>
-            </a:r>
-          </a:p>
-          <a:p>
-            <a:r>
-              <a:rPr lang="en-US" dirty="0" err="1"/>
-              <a:t>IoTZ</a:t>
-            </a:r>
-            <a:endParaRPr lang="en-US" dirty="0"/>
-          </a:p>
-          <a:p>
-            <a:endParaRPr lang="en-US" dirty="0"/>
+              <a:t>Pros</a:t>
+            </a:r>
+          </a:p>
+          <a:p>
+            <a:pPr lvl="1"/>
+            <a:r>
+              <a:rPr lang="en-US" dirty="0"/>
+              <a:t>Cross Platform</a:t>
+            </a:r>
+          </a:p>
+          <a:p>
+            <a:pPr lvl="1"/>
+            <a:r>
+              <a:rPr lang="en-US" dirty="0"/>
+              <a:t>Cross IDE</a:t>
+            </a:r>
+          </a:p>
+          <a:p>
+            <a:pPr lvl="1"/>
+            <a:r>
+              <a:rPr lang="en-US" dirty="0"/>
+              <a:t>Can add unit tests!!!</a:t>
+            </a:r>
+          </a:p>
+          <a:p>
+            <a:r>
+              <a:rPr lang="en-US" dirty="0"/>
+              <a:t>Cons</a:t>
+            </a:r>
+          </a:p>
+          <a:p>
+            <a:pPr lvl="1"/>
+            <a:r>
+              <a:rPr lang="en-US" dirty="0"/>
+              <a:t>Lots of time to setup</a:t>
+            </a:r>
+          </a:p>
+          <a:p>
+            <a:pPr lvl="1"/>
+            <a:r>
+              <a:rPr lang="en-US" dirty="0"/>
+              <a:t>Easy to lose cross-platform benefits</a:t>
+            </a:r>
           </a:p>
         </p:txBody>
       </p:sp>
     </p:spTree>
     <p:extLst>
       <p:ext uri="{BB962C8B-B14F-4D97-AF65-F5344CB8AC3E}">
-        <p14:creationId xmlns:p14="http://schemas.microsoft.com/office/powerpoint/2010/main" val="2846401357"/>
+        <p14:creationId xmlns:p14="http://schemas.microsoft.com/office/powerpoint/2010/main" val="3030896848"/>
       </p:ext>
     </p:extLst>
   </p:cSld>
@@ -4125,7 +4623,7 @@
           <p:cNvPr id="2" name="Title 1">
             <a:extLst>
               <a:ext uri="{FF2B5EF4-FFF2-40B4-BE49-F238E27FC236}">
-                <a16:creationId xmlns:a16="http://schemas.microsoft.com/office/drawing/2014/main" id="{BF1D3485-E559-4C5C-9AE8-FDAF90EE107C}"/>
+                <a16:creationId xmlns:a16="http://schemas.microsoft.com/office/drawing/2014/main" id="{A128EE65-31EF-44FE-BC67-CA80A8E287D1}"/>
               </a:ext>
             </a:extLst>
           </p:cNvPr>
@@ -4143,7 +4641,7 @@
           <a:p>
             <a:r>
               <a:rPr lang="en-US" dirty="0"/>
-              <a:t>What else to look into?</a:t>
+              <a:t>Other Systems</a:t>
             </a:r>
           </a:p>
         </p:txBody>
@@ -4153,7 +4651,7 @@
           <p:cNvPr id="3" name="Content Placeholder 2">
             <a:extLst>
               <a:ext uri="{FF2B5EF4-FFF2-40B4-BE49-F238E27FC236}">
-                <a16:creationId xmlns:a16="http://schemas.microsoft.com/office/drawing/2014/main" id="{DB32B1E2-3425-4A03-8687-76AC80C0982D}"/>
+                <a16:creationId xmlns:a16="http://schemas.microsoft.com/office/drawing/2014/main" id="{97A065C6-0EE3-49F1-B89B-5E171E168131}"/>
               </a:ext>
             </a:extLst>
           </p:cNvPr>
@@ -4171,27 +4669,7 @@
           <a:p>
             <a:r>
               <a:rPr lang="en-US" dirty="0"/>
-              <a:t>Debuggers</a:t>
-            </a:r>
-          </a:p>
-          <a:p>
-            <a:pPr lvl="1"/>
-            <a:r>
-              <a:rPr lang="en-US" dirty="0"/>
-              <a:t>They exist!</a:t>
-            </a:r>
-          </a:p>
-          <a:p>
-            <a:pPr lvl="1"/>
-            <a:r>
-              <a:rPr lang="en-US" dirty="0"/>
-              <a:t>No idea how they work…</a:t>
-            </a:r>
-          </a:p>
-          <a:p>
-            <a:r>
-              <a:rPr lang="en-US" dirty="0"/>
-              <a:t>Other build systems for C/C++</a:t>
+              <a:t>Arduino CLI</a:t>
             </a:r>
           </a:p>
           <a:p>
@@ -4200,19 +4678,75 @@
               <a:rPr lang="en-US" dirty="0">
                 <a:hlinkClick r:id="rId2"/>
               </a:rPr>
-              <a:t>https://medium.com/@julienjorge/an-overview-of-build-systems-mostly-for-c-projects-ac9931494444</a:t>
-            </a:r>
-            <a:r>
-              <a:rPr lang="en-US" dirty="0"/>
-              <a:t> </a:t>
-            </a:r>
+              <a:t>https://github.com/arduino/arduino-cli</a:t>
+            </a:r>
+            <a:endParaRPr lang="en-US" dirty="0"/>
+          </a:p>
+          <a:p>
+            <a:pPr lvl="1"/>
+            <a:r>
+              <a:rPr lang="en-US" dirty="0"/>
+              <a:t>Arduino IDE, but a CLI tool</a:t>
+            </a:r>
+          </a:p>
+          <a:p>
+            <a:pPr lvl="1"/>
+            <a:r>
+              <a:rPr lang="en-US" dirty="0"/>
+              <a:t>Meant for scripting scenarios</a:t>
+            </a:r>
+          </a:p>
+          <a:p>
+            <a:r>
+              <a:rPr lang="en-US" dirty="0" err="1"/>
+              <a:t>IoTZ</a:t>
+            </a:r>
+            <a:endParaRPr lang="en-US" dirty="0"/>
+          </a:p>
+          <a:p>
+            <a:pPr lvl="1"/>
+            <a:r>
+              <a:rPr lang="en-US" dirty="0">
+                <a:hlinkClick r:id="rId3"/>
+              </a:rPr>
+              <a:t>https://github.com/Azure/iotz</a:t>
+            </a:r>
+            <a:endParaRPr lang="en-US" dirty="0"/>
+          </a:p>
+          <a:p>
+            <a:pPr lvl="1"/>
+            <a:r>
+              <a:rPr lang="en-US" dirty="0"/>
+              <a:t>Wrapper to other tools for working with embedded applications</a:t>
+            </a:r>
+          </a:p>
+          <a:p>
+            <a:pPr lvl="2"/>
+            <a:r>
+              <a:rPr lang="en-US" dirty="0"/>
+              <a:t>One Stop Shop for embedded tooling</a:t>
+            </a:r>
+          </a:p>
+          <a:p>
+            <a:pPr lvl="1"/>
+            <a:r>
+              <a:rPr lang="en-US" dirty="0"/>
+              <a:t>NPM Package</a:t>
+            </a:r>
+          </a:p>
+          <a:p>
+            <a:pPr lvl="1"/>
+            <a:endParaRPr lang="en-US" dirty="0"/>
+          </a:p>
+          <a:p>
+            <a:endParaRPr lang="en-US" dirty="0"/>
           </a:p>
         </p:txBody>
       </p:sp>
     </p:spTree>
     <p:extLst>
       <p:ext uri="{BB962C8B-B14F-4D97-AF65-F5344CB8AC3E}">
-        <p14:creationId xmlns:p14="http://schemas.microsoft.com/office/powerpoint/2010/main" val="2395508510"/>
+        <p14:creationId xmlns:p14="http://schemas.microsoft.com/office/powerpoint/2010/main" val="2846401357"/>
       </p:ext>
     </p:extLst>
   </p:cSld>
@@ -4244,7 +4778,7 @@
           <p:cNvPr id="2" name="Title 1">
             <a:extLst>
               <a:ext uri="{FF2B5EF4-FFF2-40B4-BE49-F238E27FC236}">
-                <a16:creationId xmlns:a16="http://schemas.microsoft.com/office/drawing/2014/main" id="{052826F9-4EE7-4A89-A4FE-76B6169F1069}"/>
+                <a16:creationId xmlns:a16="http://schemas.microsoft.com/office/drawing/2014/main" id="{698C15FA-0CA0-4DBD-BEBD-B45EABADD77C}"/>
               </a:ext>
             </a:extLst>
           </p:cNvPr>
@@ -4262,7 +4796,7 @@
           <a:p>
             <a:r>
               <a:rPr lang="en-US" dirty="0"/>
-              <a:t>Other Resources</a:t>
+              <a:t>What’s Installed on the Machine</a:t>
             </a:r>
           </a:p>
         </p:txBody>
@@ -4272,7 +4806,7 @@
           <p:cNvPr id="3" name="Content Placeholder 2">
             <a:extLst>
               <a:ext uri="{FF2B5EF4-FFF2-40B4-BE49-F238E27FC236}">
-                <a16:creationId xmlns:a16="http://schemas.microsoft.com/office/drawing/2014/main" id="{319FEAD7-6601-4185-87F0-69EFEC033A5F}"/>
+                <a16:creationId xmlns:a16="http://schemas.microsoft.com/office/drawing/2014/main" id="{12F642C4-0EC5-448F-B821-7EE68C74723E}"/>
               </a:ext>
             </a:extLst>
           </p:cNvPr>
@@ -4285,41 +4819,123 @@
         </p:nvSpPr>
         <p:spPr/>
         <p:txBody>
-          <a:bodyPr/>
-          <a:lstStyle/>
-          <a:p>
-            <a:r>
-              <a:rPr lang="en-US" dirty="0"/>
-              <a:t>ATMEL AVR Microcontrollers book</a:t>
+          <a:bodyPr>
+            <a:normAutofit fontScale="85000" lnSpcReduction="20000"/>
+          </a:bodyPr>
+          <a:lstStyle/>
+          <a:p>
+            <a:r>
+              <a:rPr lang="en-US" dirty="0"/>
+              <a:t>Arduino</a:t>
             </a:r>
           </a:p>
           <a:p>
             <a:pPr lvl="1"/>
             <a:r>
               <a:rPr lang="en-US" dirty="0"/>
-              <a:t>Starts out with a great description embedded development in general</a:t>
+              <a:t>Just for </a:t>
+            </a:r>
+            <a:r>
+              <a:rPr lang="en-US" dirty="0" err="1"/>
+              <a:t>AVRDude</a:t>
+            </a:r>
+            <a:r>
+              <a:rPr lang="en-US" dirty="0"/>
+              <a:t>. You may not need this for your projects.</a:t>
+            </a:r>
+          </a:p>
+          <a:p>
+            <a:r>
+              <a:rPr lang="en-US" dirty="0"/>
+              <a:t>Atmel Studio</a:t>
             </a:r>
           </a:p>
           <a:p>
             <a:pPr lvl="1"/>
             <a:r>
-              <a:rPr lang="en-US" dirty="0">
-                <a:hlinkClick r:id="rId2"/>
-              </a:rPr>
-              <a:t>https://www.amazon.com/Programming-Interfacing-ATMELs-Thomas-Grace/dp/1305509994</a:t>
+              <a:rPr lang="en-US" dirty="0"/>
+              <a:t>AVR Toolchain</a:t>
+            </a:r>
+          </a:p>
+          <a:p>
+            <a:pPr lvl="2"/>
+            <a:r>
+              <a:rPr lang="en-US" dirty="0"/>
+              <a:t>C/C++ compilers, linker, </a:t>
+            </a:r>
+            <a:r>
+              <a:rPr lang="en-US" dirty="0" err="1"/>
+              <a:t>etc</a:t>
             </a:r>
             <a:endParaRPr lang="en-US" dirty="0"/>
           </a:p>
           <a:p>
             <a:pPr lvl="1"/>
+            <a:r>
+              <a:rPr lang="en-US" dirty="0"/>
+              <a:t>AVR Standard Library</a:t>
+            </a:r>
+          </a:p>
+          <a:p>
+            <a:pPr lvl="1"/>
+            <a:r>
+              <a:rPr lang="en-US" dirty="0"/>
+              <a:t>Note: Arduino IDE Installs this too</a:t>
+            </a:r>
+          </a:p>
+          <a:p>
+            <a:pPr lvl="2"/>
+            <a:r>
+              <a:rPr lang="en-US" dirty="0"/>
+              <a:t>Atmel Studio has newer versions than what Arduino comes with</a:t>
+            </a:r>
+          </a:p>
+          <a:p>
+            <a:r>
+              <a:rPr lang="en-US" dirty="0"/>
+              <a:t>Visual Studio 2017</a:t>
+            </a:r>
+          </a:p>
+          <a:p>
+            <a:pPr lvl="1"/>
+            <a:r>
+              <a:rPr lang="en-US" dirty="0"/>
+              <a:t>Include C++ features </a:t>
+            </a:r>
+          </a:p>
+          <a:p>
+            <a:pPr lvl="1"/>
+            <a:r>
+              <a:rPr lang="en-US" dirty="0"/>
+              <a:t>Include Windows 8.1 SDK (for compiling unit tests to x86)</a:t>
+            </a:r>
+          </a:p>
+          <a:p>
+            <a:r>
+              <a:rPr lang="en-US" dirty="0" err="1"/>
+              <a:t>NMake</a:t>
+            </a:r>
             <a:endParaRPr lang="en-US" dirty="0"/>
+          </a:p>
+          <a:p>
+            <a:pPr lvl="1"/>
+            <a:r>
+              <a:rPr lang="en-US" dirty="0"/>
+              <a:t>Installed by Visual Studio</a:t>
+            </a:r>
+          </a:p>
+          <a:p>
+            <a:r>
+              <a:rPr lang="en-US" dirty="0"/>
+              <a:t>CMake</a:t>
+            </a:r>
           </a:p>
         </p:txBody>
       </p:sp>
     </p:spTree>
     <p:extLst>
       <p:ext uri="{BB962C8B-B14F-4D97-AF65-F5344CB8AC3E}">
-        <p14:creationId xmlns:p14="http://schemas.microsoft.com/office/powerpoint/2010/main" val="908638447"/>
+        <p14:creationId xmlns:p14="http://schemas.microsoft.com/office/powerpoint/2010/main" val="3178765910"/>
       </p:ext>
     </p:extLst>
   </p:cSld>

</xml_diff>

<commit_message>
Added a few bits of into to PowerPoint file
</commit_message>
<xml_diff>
--- a/Presentation.pptx
+++ b/Presentation.pptx
@@ -15,8 +15,9 @@
     <p:sldId id="259" r:id="rId9"/>
     <p:sldId id="266" r:id="rId10"/>
     <p:sldId id="267" r:id="rId11"/>
-    <p:sldId id="262" r:id="rId12"/>
-    <p:sldId id="264" r:id="rId13"/>
+    <p:sldId id="270" r:id="rId12"/>
+    <p:sldId id="262" r:id="rId13"/>
+    <p:sldId id="264" r:id="rId14"/>
   </p:sldIdLst>
   <p:sldSz cx="12192000" cy="6858000"/>
   <p:notesSz cx="6858000" cy="9144000"/>
@@ -3559,6 +3560,105 @@
           <p:cNvPr id="2" name="Title 1">
             <a:extLst>
               <a:ext uri="{FF2B5EF4-FFF2-40B4-BE49-F238E27FC236}">
+                <a16:creationId xmlns:a16="http://schemas.microsoft.com/office/drawing/2014/main" id="{741CC98F-CC5D-4759-9A6E-3AAFE19EE720}"/>
+              </a:ext>
+            </a:extLst>
+          </p:cNvPr>
+          <p:cNvSpPr>
+            <a:spLocks noGrp="1"/>
+          </p:cNvSpPr>
+          <p:nvPr>
+            <p:ph type="title"/>
+          </p:nvPr>
+        </p:nvSpPr>
+        <p:spPr/>
+        <p:txBody>
+          <a:bodyPr/>
+          <a:lstStyle/>
+          <a:p>
+            <a:r>
+              <a:rPr lang="en-US" dirty="0"/>
+              <a:t>Cmake Gotchas</a:t>
+            </a:r>
+          </a:p>
+        </p:txBody>
+      </p:sp>
+      <p:sp>
+        <p:nvSpPr>
+          <p:cNvPr id="3" name="Content Placeholder 2">
+            <a:extLst>
+              <a:ext uri="{FF2B5EF4-FFF2-40B4-BE49-F238E27FC236}">
+                <a16:creationId xmlns:a16="http://schemas.microsoft.com/office/drawing/2014/main" id="{FE11CAD4-2E9A-44FC-9C10-5E18338DA1CA}"/>
+              </a:ext>
+            </a:extLst>
+          </p:cNvPr>
+          <p:cNvSpPr>
+            <a:spLocks noGrp="1"/>
+          </p:cNvSpPr>
+          <p:nvPr>
+            <p:ph idx="1"/>
+          </p:nvPr>
+        </p:nvSpPr>
+        <p:spPr/>
+        <p:txBody>
+          <a:bodyPr/>
+          <a:lstStyle/>
+          <a:p>
+            <a:r>
+              <a:rPr lang="en-US" dirty="0"/>
+              <a:t>Manually add/remove files included in compilation</a:t>
+            </a:r>
+          </a:p>
+          <a:p>
+            <a:r>
+              <a:rPr lang="en-US" dirty="0"/>
+              <a:t>Variable scope</a:t>
+            </a:r>
+            <a:r>
+              <a:rPr lang="en-US"/>
+              <a:t>/lifetime</a:t>
+            </a:r>
+          </a:p>
+          <a:p>
+            <a:endParaRPr lang="en-US" dirty="0"/>
+          </a:p>
+        </p:txBody>
+      </p:sp>
+    </p:spTree>
+    <p:extLst>
+      <p:ext uri="{BB962C8B-B14F-4D97-AF65-F5344CB8AC3E}">
+        <p14:creationId xmlns:p14="http://schemas.microsoft.com/office/powerpoint/2010/main" val="1156681627"/>
+      </p:ext>
+    </p:extLst>
+  </p:cSld>
+  <p:clrMapOvr>
+    <a:masterClrMapping/>
+  </p:clrMapOvr>
+</p:sld>
+</file>
+
+<file path=ppt/slides/slide12.xml><?xml version="1.0" encoding="utf-8"?>
+<p:sld xmlns:a="http://schemas.openxmlformats.org/drawingml/2006/main" xmlns:r="http://schemas.openxmlformats.org/officeDocument/2006/relationships" xmlns:p="http://schemas.openxmlformats.org/presentationml/2006/main">
+  <p:cSld>
+    <p:spTree>
+      <p:nvGrpSpPr>
+        <p:cNvPr id="1" name=""/>
+        <p:cNvGrpSpPr/>
+        <p:nvPr/>
+      </p:nvGrpSpPr>
+      <p:grpSpPr>
+        <a:xfrm>
+          <a:off x="0" y="0"/>
+          <a:ext cx="0" cy="0"/>
+          <a:chOff x="0" y="0"/>
+          <a:chExt cx="0" cy="0"/>
+        </a:xfrm>
+      </p:grpSpPr>
+      <p:sp>
+        <p:nvSpPr>
+          <p:cNvPr id="2" name="Title 1">
+            <a:extLst>
+              <a:ext uri="{FF2B5EF4-FFF2-40B4-BE49-F238E27FC236}">
                 <a16:creationId xmlns:a16="http://schemas.microsoft.com/office/drawing/2014/main" id="{BF1D3485-E559-4C5C-9AE8-FDAF90EE107C}"/>
               </a:ext>
             </a:extLst>
@@ -3674,7 +3774,7 @@
 </p:sld>
 </file>
 
-<file path=ppt/slides/slide12.xml><?xml version="1.0" encoding="utf-8"?>
+<file path=ppt/slides/slide13.xml><?xml version="1.0" encoding="utf-8"?>
 <p:sld xmlns:a="http://schemas.openxmlformats.org/drawingml/2006/main" xmlns:r="http://schemas.openxmlformats.org/officeDocument/2006/relationships" xmlns:p="http://schemas.openxmlformats.org/presentationml/2006/main">
   <p:cSld>
     <p:spTree>

</xml_diff>